<commit_message>
Add comment function(modify, delete)
</commit_message>
<xml_diff>
--- a/Function.pptx
+++ b/Function.pptx
@@ -3294,7 +3294,7 @@
         <p:spPr>
           <a:xfrm>
             <a:off x="5087705" y="1194204"/>
-            <a:ext cx="3427541" cy="1277273"/>
+            <a:ext cx="3427541" cy="1446550"/>
           </a:xfrm>
           <a:prstGeom prst="rect">
             <a:avLst/>
@@ -3368,7 +3368,42 @@
             </a:pPr>
             <a:r>
               <a:rPr lang="ko-KR" altLang="en-US" sz="1100" dirty="0" smtClean="0"/>
-              <a:t>새글 작성시 비로그인이면 로그인 화면으로 이동</a:t>
+              <a:t>새글 작성시 비로그인이면 로그인 화면으로 </a:t>
+            </a:r>
+            <a:r>
+              <a:rPr lang="ko-KR" altLang="en-US" sz="1100" dirty="0" smtClean="0"/>
+              <a:t>이동</a:t>
+            </a:r>
+            <a:endParaRPr lang="en-US" altLang="ko-KR" sz="1100" dirty="0" smtClean="0"/>
+          </a:p>
+          <a:p>
+            <a:pPr marL="171450" indent="-171450">
+              <a:buFont typeface="Arial" pitchFamily="34" charset="0"/>
+              <a:buChar char="•"/>
+            </a:pPr>
+            <a:r>
+              <a:rPr lang="ko-KR" altLang="en-US" sz="1100" dirty="0" smtClean="0"/>
+              <a:t>질문 삭제</a:t>
+            </a:r>
+            <a:r>
+              <a:rPr lang="en-US" altLang="ko-KR" sz="1100" dirty="0" smtClean="0"/>
+              <a:t>, </a:t>
+            </a:r>
+            <a:r>
+              <a:rPr lang="ko-KR" altLang="en-US" sz="1100" dirty="0" smtClean="0"/>
+              <a:t>수정 </a:t>
+            </a:r>
+            <a:r>
+              <a:rPr lang="en-US" altLang="ko-KR" sz="1100" dirty="0" smtClean="0"/>
+              <a:t>(</a:t>
+            </a:r>
+            <a:r>
+              <a:rPr lang="ko-KR" altLang="en-US" sz="1100" dirty="0" smtClean="0"/>
+              <a:t>작성자일 경우만</a:t>
+            </a:r>
+            <a:r>
+              <a:rPr lang="en-US" altLang="ko-KR" sz="1100" dirty="0" smtClean="0"/>
+              <a:t>)</a:t>
             </a:r>
             <a:endParaRPr lang="en-US" altLang="ko-KR" sz="1100" dirty="0" smtClean="0"/>
           </a:p>

</xml_diff>